<commit_message>
Code is experiment ready. Changed calibration to be easier.
Calibration is now saved for all leaps, so that every keyboard doesn't
have to be calibrated separately.
</commit_message>
<xml_diff>
--- a/docs/IRB/benoit_ResearchPoster_final.pptx
+++ b/docs/IRB/benoit_ResearchPoster_final.pptx
@@ -246,7 +246,7 @@
           <a:p>
             <a:fld id="{1D8BD707-D9CF-40AE-B4C6-C98DA3205C09}" type="datetimeFigureOut">
               <a:rPr lang="en-US"/>
-              <a:t>8/31/2015</a:t>
+              <a:t>9/9/2015</a:t>
             </a:fld>
             <a:endParaRPr lang="en-US"/>
           </a:p>
@@ -411,7 +411,7 @@
           <a:p>
             <a:fld id="{1D8BD707-D9CF-40AE-B4C6-C98DA3205C09}" type="datetimeFigureOut">
               <a:rPr lang="en-US"/>
-              <a:t>8/31/2015</a:t>
+              <a:t>9/9/2015</a:t>
             </a:fld>
             <a:endParaRPr lang="en-US"/>
           </a:p>
@@ -619,7 +619,7 @@
           <a:p>
             <a:fld id="{1D8BD707-D9CF-40AE-B4C6-C98DA3205C09}" type="datetimeFigureOut">
               <a:rPr lang="en-US"/>
-              <a:t>8/31/2015</a:t>
+              <a:t>9/9/2015</a:t>
             </a:fld>
             <a:endParaRPr lang="en-US"/>
           </a:p>
@@ -761,7 +761,7 @@
           <a:p>
             <a:fld id="{1D8BD707-D9CF-40AE-B4C6-C98DA3205C09}" type="datetimeFigureOut">
               <a:rPr lang="en-US"/>
-              <a:t>8/31/2015</a:t>
+              <a:t>9/9/2015</a:t>
             </a:fld>
             <a:endParaRPr lang="en-US"/>
           </a:p>
@@ -880,7 +880,7 @@
           <a:p>
             <a:fld id="{1D8BD707-D9CF-40AE-B4C6-C98DA3205C09}" type="datetimeFigureOut">
               <a:rPr lang="en-US"/>
-              <a:t>8/31/2015</a:t>
+              <a:t>9/9/2015</a:t>
             </a:fld>
             <a:endParaRPr lang="en-US"/>
           </a:p>
@@ -1300,7 +1300,7 @@
           <a:p>
             <a:fld id="{1D8BD707-D9CF-40AE-B4C6-C98DA3205C09}" type="datetimeFigureOut">
               <a:rPr lang="en-US"/>
-              <a:t>8/31/2015</a:t>
+              <a:t>9/9/2015</a:t>
             </a:fld>
             <a:endParaRPr lang="en-US"/>
           </a:p>
@@ -4371,7 +4371,7 @@
               <a:t> </a:t>
             </a:r>
             <a:r>
-              <a:rPr sz="1500" spc="-35" dirty="0">
+              <a:rPr sz="1500" spc="-35">
                 <a:solidFill>
                   <a:schemeClr val="bg1"/>
                 </a:solidFill>
@@ -4381,24 +4381,124 @@
               <a:t>one</a:t>
             </a:r>
             <a:r>
-              <a:rPr sz="1500" spc="-95" dirty="0">
-                <a:solidFill>
-                  <a:schemeClr val="bg1"/>
-                </a:solidFill>
-                <a:latin typeface="Arial"/>
-                <a:cs typeface="Arial"/>
-              </a:rPr>
-              <a:t> </a:t>
-            </a:r>
-            <a:r>
-              <a:rPr sz="1500" spc="-35" dirty="0">
-                <a:solidFill>
-                  <a:schemeClr val="bg1"/>
-                </a:solidFill>
-                <a:latin typeface="Arial"/>
-                <a:cs typeface="Arial"/>
-              </a:rPr>
-              <a:t>45-60</a:t>
+              <a:rPr sz="1500" spc="-95">
+                <a:solidFill>
+                  <a:schemeClr val="bg1"/>
+                </a:solidFill>
+                <a:latin typeface="Arial"/>
+                <a:cs typeface="Arial"/>
+              </a:rPr>
+              <a:t> </a:t>
+            </a:r>
+            <a:r>
+              <a:rPr lang="en-US" sz="1500" spc="-35" smtClean="0">
+                <a:solidFill>
+                  <a:schemeClr val="bg1"/>
+                </a:solidFill>
+                <a:latin typeface="Arial"/>
+                <a:cs typeface="Arial"/>
+              </a:rPr>
+              <a:t>30</a:t>
+            </a:r>
+            <a:r>
+              <a:rPr sz="1500" spc="-35" smtClean="0">
+                <a:solidFill>
+                  <a:schemeClr val="bg1"/>
+                </a:solidFill>
+                <a:latin typeface="Arial"/>
+                <a:cs typeface="Arial"/>
+              </a:rPr>
+              <a:t>-60</a:t>
+            </a:r>
+            <a:r>
+              <a:rPr sz="1500" spc="-20" smtClean="0">
+                <a:solidFill>
+                  <a:schemeClr val="bg1"/>
+                </a:solidFill>
+                <a:latin typeface="Arial"/>
+                <a:cs typeface="Arial"/>
+              </a:rPr>
+              <a:t> </a:t>
+            </a:r>
+            <a:r>
+              <a:rPr sz="1500" spc="-55" dirty="0">
+                <a:solidFill>
+                  <a:schemeClr val="bg1"/>
+                </a:solidFill>
+                <a:latin typeface="Arial"/>
+                <a:cs typeface="Arial"/>
+              </a:rPr>
+              <a:t>minute</a:t>
+            </a:r>
+            <a:r>
+              <a:rPr sz="1500" spc="5" dirty="0">
+                <a:solidFill>
+                  <a:schemeClr val="bg1"/>
+                </a:solidFill>
+                <a:latin typeface="Arial"/>
+                <a:cs typeface="Arial"/>
+              </a:rPr>
+              <a:t> </a:t>
+            </a:r>
+            <a:r>
+              <a:rPr sz="1500" spc="-105" dirty="0">
+                <a:solidFill>
+                  <a:schemeClr val="bg1"/>
+                </a:solidFill>
+                <a:latin typeface="Arial"/>
+                <a:cs typeface="Arial"/>
+              </a:rPr>
+              <a:t>session</a:t>
+            </a:r>
+            <a:r>
+              <a:rPr sz="1500" spc="50" dirty="0">
+                <a:solidFill>
+                  <a:schemeClr val="bg1"/>
+                </a:solidFill>
+                <a:latin typeface="Arial"/>
+                <a:cs typeface="Arial"/>
+              </a:rPr>
+              <a:t> </a:t>
+            </a:r>
+            <a:r>
+              <a:rPr sz="1500" spc="-50" dirty="0">
+                <a:solidFill>
+                  <a:schemeClr val="bg1"/>
+                </a:solidFill>
+                <a:latin typeface="Arial"/>
+                <a:cs typeface="Arial"/>
+              </a:rPr>
+              <a:t>and</a:t>
+            </a:r>
+            <a:r>
+              <a:rPr sz="1500" spc="-45" dirty="0">
+                <a:solidFill>
+                  <a:schemeClr val="bg1"/>
+                </a:solidFill>
+                <a:latin typeface="Arial"/>
+                <a:cs typeface="Arial"/>
+              </a:rPr>
+              <a:t> </a:t>
+            </a:r>
+            <a:r>
+              <a:rPr sz="1500" spc="-65" dirty="0">
+                <a:solidFill>
+                  <a:schemeClr val="bg1"/>
+                </a:solidFill>
+                <a:latin typeface="Arial"/>
+                <a:cs typeface="Arial"/>
+              </a:rPr>
+              <a:t>can</a:t>
+            </a:r>
+            <a:r>
+              <a:rPr sz="1500" spc="-10" dirty="0">
+                <a:solidFill>
+                  <a:schemeClr val="bg1"/>
+                </a:solidFill>
+                <a:latin typeface="Arial"/>
+                <a:cs typeface="Arial"/>
+              </a:rPr>
+              <a:t> </a:t>
             </a:r>
             <a:r>
               <a:rPr sz="1500" spc="-20" dirty="0">
@@ -4408,40 +4508,40 @@
                 <a:latin typeface="Arial"/>
                 <a:cs typeface="Arial"/>
               </a:rPr>
-              <a:t> </a:t>
-            </a:r>
-            <a:r>
-              <a:rPr sz="1500" spc="-55" dirty="0">
-                <a:solidFill>
-                  <a:schemeClr val="bg1"/>
-                </a:solidFill>
-                <a:latin typeface="Arial"/>
-                <a:cs typeface="Arial"/>
-              </a:rPr>
-              <a:t>minute</a:t>
-            </a:r>
-            <a:r>
-              <a:rPr sz="1500" spc="5" dirty="0">
-                <a:solidFill>
-                  <a:schemeClr val="bg1"/>
-                </a:solidFill>
-                <a:latin typeface="Arial"/>
-                <a:cs typeface="Arial"/>
-              </a:rPr>
-              <a:t> </a:t>
-            </a:r>
-            <a:r>
-              <a:rPr sz="1500" spc="-105" dirty="0">
-                <a:solidFill>
-                  <a:schemeClr val="bg1"/>
-                </a:solidFill>
-                <a:latin typeface="Arial"/>
-                <a:cs typeface="Arial"/>
-              </a:rPr>
-              <a:t>session</a:t>
-            </a:r>
-            <a:r>
-              <a:rPr sz="1500" spc="50" dirty="0">
+              <a:t>be</a:t>
+            </a:r>
+            <a:r>
+              <a:rPr sz="1500" spc="-80" dirty="0">
+                <a:solidFill>
+                  <a:schemeClr val="bg1"/>
+                </a:solidFill>
+                <a:latin typeface="Arial"/>
+                <a:cs typeface="Arial"/>
+              </a:rPr>
+              <a:t> scheduled</a:t>
+            </a:r>
+            <a:r>
+              <a:rPr sz="1500" spc="-45" dirty="0">
+                <a:solidFill>
+                  <a:schemeClr val="bg1"/>
+                </a:solidFill>
+                <a:latin typeface="Arial"/>
+                <a:cs typeface="Arial"/>
+              </a:rPr>
+              <a:t> </a:t>
+            </a:r>
+            <a:r>
+              <a:rPr sz="1500" spc="-65" dirty="0">
+                <a:solidFill>
+                  <a:schemeClr val="bg1"/>
+                </a:solidFill>
+                <a:latin typeface="Arial"/>
+                <a:cs typeface="Arial"/>
+              </a:rPr>
+              <a:t>any</a:t>
+            </a:r>
+            <a:r>
+              <a:rPr sz="1500" spc="-60" dirty="0">
                 <a:solidFill>
                   <a:schemeClr val="bg1"/>
                 </a:solidFill>
@@ -4458,10 +4558,10 @@
                 <a:latin typeface="Arial"/>
                 <a:cs typeface="Arial"/>
               </a:rPr>
-              <a:t>and</a:t>
-            </a:r>
-            <a:r>
-              <a:rPr sz="1500" spc="-45" dirty="0">
+              <a:t>day</a:t>
+            </a:r>
+            <a:r>
+              <a:rPr sz="1500" spc="35" dirty="0">
                 <a:solidFill>
                   <a:schemeClr val="bg1"/>
                 </a:solidFill>
@@ -4478,120 +4578,70 @@
                 <a:latin typeface="Arial"/>
                 <a:cs typeface="Arial"/>
               </a:rPr>
-              <a:t>can</a:t>
-            </a:r>
-            <a:r>
-              <a:rPr sz="1500" spc="-10" dirty="0">
-                <a:solidFill>
-                  <a:schemeClr val="bg1"/>
-                </a:solidFill>
-                <a:latin typeface="Arial"/>
-                <a:cs typeface="Arial"/>
-              </a:rPr>
-              <a:t> </a:t>
-            </a:r>
-            <a:r>
-              <a:rPr sz="1500" spc="-20" dirty="0">
-                <a:solidFill>
-                  <a:schemeClr val="bg1"/>
-                </a:solidFill>
-                <a:latin typeface="Arial"/>
-                <a:cs typeface="Arial"/>
-              </a:rPr>
-              <a:t>be</a:t>
-            </a:r>
-            <a:r>
-              <a:rPr sz="1500" spc="-80" dirty="0">
-                <a:solidFill>
-                  <a:schemeClr val="bg1"/>
-                </a:solidFill>
-                <a:latin typeface="Arial"/>
-                <a:cs typeface="Arial"/>
-              </a:rPr>
-              <a:t> scheduled</a:t>
-            </a:r>
-            <a:r>
-              <a:rPr sz="1500" spc="-45" dirty="0">
-                <a:solidFill>
-                  <a:schemeClr val="bg1"/>
-                </a:solidFill>
-                <a:latin typeface="Arial"/>
-                <a:cs typeface="Arial"/>
-              </a:rPr>
-              <a:t> </a:t>
-            </a:r>
-            <a:r>
-              <a:rPr sz="1500" spc="-65" dirty="0">
-                <a:solidFill>
-                  <a:schemeClr val="bg1"/>
-                </a:solidFill>
-                <a:latin typeface="Arial"/>
-                <a:cs typeface="Arial"/>
-              </a:rPr>
-              <a:t>any</a:t>
-            </a:r>
-            <a:r>
-              <a:rPr sz="1500" spc="-60" dirty="0">
-                <a:solidFill>
-                  <a:schemeClr val="bg1"/>
-                </a:solidFill>
-                <a:latin typeface="Arial"/>
-                <a:cs typeface="Arial"/>
-              </a:rPr>
-              <a:t> </a:t>
-            </a:r>
-            <a:r>
-              <a:rPr sz="1500" spc="-50" dirty="0">
-                <a:solidFill>
-                  <a:schemeClr val="bg1"/>
-                </a:solidFill>
-                <a:latin typeface="Arial"/>
-                <a:cs typeface="Arial"/>
-              </a:rPr>
-              <a:t>day</a:t>
-            </a:r>
-            <a:r>
-              <a:rPr sz="1500" spc="35" dirty="0">
-                <a:solidFill>
-                  <a:schemeClr val="bg1"/>
-                </a:solidFill>
-                <a:latin typeface="Arial"/>
-                <a:cs typeface="Arial"/>
-              </a:rPr>
-              <a:t> </a:t>
-            </a:r>
-            <a:r>
-              <a:rPr sz="1500" spc="-65">
-                <a:solidFill>
-                  <a:schemeClr val="bg1"/>
-                </a:solidFill>
-                <a:latin typeface="Arial"/>
-                <a:cs typeface="Arial"/>
-              </a:rPr>
               <a:t>between</a:t>
             </a:r>
             <a:r>
-              <a:rPr sz="1500" spc="45">
-                <a:solidFill>
-                  <a:schemeClr val="bg1"/>
-                </a:solidFill>
-                <a:latin typeface="Arial"/>
-                <a:cs typeface="Arial"/>
-              </a:rPr>
-              <a:t> </a:t>
-            </a:r>
-            <a:r>
-              <a:rPr lang="en-US" sz="1500" spc="-70" smtClean="0">
-                <a:solidFill>
-                  <a:schemeClr val="bg1"/>
-                </a:solidFill>
-                <a:latin typeface="Arial"/>
-                <a:cs typeface="Arial"/>
-              </a:rPr>
-              <a:t>August 6</a:t>
-            </a:r>
-            <a:r>
-              <a:rPr lang="en-US" sz="1500" spc="-70" baseline="30000" smtClean="0">
+              <a:rPr sz="1500" spc="45" dirty="0">
+                <a:solidFill>
+                  <a:schemeClr val="bg1"/>
+                </a:solidFill>
+                <a:latin typeface="Arial"/>
+                <a:cs typeface="Arial"/>
+              </a:rPr>
+              <a:t> </a:t>
+            </a:r>
+            <a:r>
+              <a:rPr lang="en-US" sz="1500" spc="-70" dirty="0" smtClean="0">
+                <a:solidFill>
+                  <a:schemeClr val="bg1"/>
+                </a:solidFill>
+                <a:latin typeface="Arial"/>
+                <a:cs typeface="Arial"/>
+              </a:rPr>
+              <a:t>September 14</a:t>
+            </a:r>
+            <a:r>
+              <a:rPr lang="en-US" sz="1500" spc="-70" baseline="30000" dirty="0" smtClean="0">
+                <a:solidFill>
+                  <a:schemeClr val="bg1"/>
+                </a:solidFill>
+                <a:latin typeface="Arial"/>
+                <a:cs typeface="Arial"/>
+              </a:rPr>
+              <a:t>th </a:t>
+            </a:r>
+            <a:r>
+              <a:rPr sz="1500" spc="30" dirty="0" smtClean="0">
+                <a:solidFill>
+                  <a:schemeClr val="bg1"/>
+                </a:solidFill>
+                <a:latin typeface="Arial"/>
+                <a:cs typeface="Arial"/>
+              </a:rPr>
+              <a:t>to</a:t>
+            </a:r>
+            <a:r>
+              <a:rPr lang="en-US" sz="1500" spc="30" dirty="0" smtClean="0">
+                <a:solidFill>
+                  <a:schemeClr val="bg1"/>
+                </a:solidFill>
+                <a:latin typeface="Arial"/>
+                <a:cs typeface="Arial"/>
+              </a:rPr>
+              <a:t> </a:t>
+            </a:r>
+            <a:r>
+              <a:rPr lang="en-US" sz="1500" spc="30" dirty="0" smtClean="0">
+                <a:solidFill>
+                  <a:schemeClr val="bg1"/>
+                </a:solidFill>
+                <a:latin typeface="Arial"/>
+                <a:cs typeface="Arial"/>
+              </a:rPr>
+              <a:t>September 19</a:t>
+            </a:r>
+            <a:r>
+              <a:rPr lang="en-US" sz="1500" spc="30" baseline="30000" dirty="0" smtClean="0">
                 <a:solidFill>
                   <a:schemeClr val="bg1"/>
                 </a:solidFill>
@@ -4599,46 +4649,6 @@
                 <a:cs typeface="Arial"/>
               </a:rPr>
               <a:t>th</a:t>
-            </a:r>
-            <a:r>
-              <a:rPr lang="en-US" sz="1500" spc="-70" baseline="30000" smtClean="0">
-                <a:solidFill>
-                  <a:schemeClr val="bg1"/>
-                </a:solidFill>
-                <a:latin typeface="Arial"/>
-                <a:cs typeface="Arial"/>
-              </a:rPr>
-              <a:t> </a:t>
-            </a:r>
-            <a:r>
-              <a:rPr sz="1500" spc="30" dirty="0" smtClean="0">
-                <a:solidFill>
-                  <a:schemeClr val="bg1"/>
-                </a:solidFill>
-                <a:latin typeface="Arial"/>
-                <a:cs typeface="Arial"/>
-              </a:rPr>
-              <a:t>to</a:t>
-            </a:r>
-            <a:r>
-              <a:rPr lang="en-US" sz="1500" spc="30" dirty="0" smtClean="0">
-                <a:solidFill>
-                  <a:schemeClr val="bg1"/>
-                </a:solidFill>
-                <a:latin typeface="Arial"/>
-                <a:cs typeface="Arial"/>
-              </a:rPr>
-              <a:t> October 1</a:t>
-            </a:r>
-            <a:r>
-              <a:rPr lang="en-US" sz="1500" spc="30" baseline="30000" dirty="0" smtClean="0">
-                <a:solidFill>
-                  <a:schemeClr val="bg1"/>
-                </a:solidFill>
-                <a:latin typeface="Arial"/>
-                <a:cs typeface="Arial"/>
-              </a:rPr>
-              <a:t>st</a:t>
             </a:r>
             <a:r>
               <a:rPr sz="1500" spc="-40" dirty="0" smtClean="0">

</xml_diff>